<commit_message>
2025-26 initial gh-pages commit
</commit_message>
<xml_diff>
--- a/images/Presentación1.pptx
+++ b/images/Presentación1.pptx
@@ -316,7 +316,7 @@
           <a:p>
             <a:fld id="{9E2B9D65-9CB5-44CB-B647-17247A1ADF60}" type="datetimeFigureOut">
               <a:rPr lang="es-ES" smtClean="0"/>
-              <a:t>02/10/2024</a:t>
+              <a:t>08/09/2025</a:t>
             </a:fld>
             <a:endParaRPr lang="es-ES"/>
           </a:p>
@@ -484,7 +484,7 @@
           <a:p>
             <a:fld id="{9E2B9D65-9CB5-44CB-B647-17247A1ADF60}" type="datetimeFigureOut">
               <a:rPr lang="es-ES" smtClean="0"/>
-              <a:t>02/10/2024</a:t>
+              <a:t>08/09/2025</a:t>
             </a:fld>
             <a:endParaRPr lang="es-ES"/>
           </a:p>
@@ -662,7 +662,7 @@
           <a:p>
             <a:fld id="{9E2B9D65-9CB5-44CB-B647-17247A1ADF60}" type="datetimeFigureOut">
               <a:rPr lang="es-ES" smtClean="0"/>
-              <a:t>02/10/2024</a:t>
+              <a:t>08/09/2025</a:t>
             </a:fld>
             <a:endParaRPr lang="es-ES"/>
           </a:p>
@@ -830,7 +830,7 @@
           <a:p>
             <a:fld id="{9E2B9D65-9CB5-44CB-B647-17247A1ADF60}" type="datetimeFigureOut">
               <a:rPr lang="es-ES" smtClean="0"/>
-              <a:t>02/10/2024</a:t>
+              <a:t>08/09/2025</a:t>
             </a:fld>
             <a:endParaRPr lang="es-ES"/>
           </a:p>
@@ -1075,7 +1075,7 @@
           <a:p>
             <a:fld id="{9E2B9D65-9CB5-44CB-B647-17247A1ADF60}" type="datetimeFigureOut">
               <a:rPr lang="es-ES" smtClean="0"/>
-              <a:t>02/10/2024</a:t>
+              <a:t>08/09/2025</a:t>
             </a:fld>
             <a:endParaRPr lang="es-ES"/>
           </a:p>
@@ -1360,7 +1360,7 @@
           <a:p>
             <a:fld id="{9E2B9D65-9CB5-44CB-B647-17247A1ADF60}" type="datetimeFigureOut">
               <a:rPr lang="es-ES" smtClean="0"/>
-              <a:t>02/10/2024</a:t>
+              <a:t>08/09/2025</a:t>
             </a:fld>
             <a:endParaRPr lang="es-ES"/>
           </a:p>
@@ -1779,7 +1779,7 @@
           <a:p>
             <a:fld id="{9E2B9D65-9CB5-44CB-B647-17247A1ADF60}" type="datetimeFigureOut">
               <a:rPr lang="es-ES" smtClean="0"/>
-              <a:t>02/10/2024</a:t>
+              <a:t>08/09/2025</a:t>
             </a:fld>
             <a:endParaRPr lang="es-ES"/>
           </a:p>
@@ -1896,7 +1896,7 @@
           <a:p>
             <a:fld id="{9E2B9D65-9CB5-44CB-B647-17247A1ADF60}" type="datetimeFigureOut">
               <a:rPr lang="es-ES" smtClean="0"/>
-              <a:t>02/10/2024</a:t>
+              <a:t>08/09/2025</a:t>
             </a:fld>
             <a:endParaRPr lang="es-ES"/>
           </a:p>
@@ -1991,7 +1991,7 @@
           <a:p>
             <a:fld id="{9E2B9D65-9CB5-44CB-B647-17247A1ADF60}" type="datetimeFigureOut">
               <a:rPr lang="es-ES" smtClean="0"/>
-              <a:t>02/10/2024</a:t>
+              <a:t>08/09/2025</a:t>
             </a:fld>
             <a:endParaRPr lang="es-ES"/>
           </a:p>
@@ -2266,7 +2266,7 @@
           <a:p>
             <a:fld id="{9E2B9D65-9CB5-44CB-B647-17247A1ADF60}" type="datetimeFigureOut">
               <a:rPr lang="es-ES" smtClean="0"/>
-              <a:t>02/10/2024</a:t>
+              <a:t>08/09/2025</a:t>
             </a:fld>
             <a:endParaRPr lang="es-ES"/>
           </a:p>
@@ -2518,7 +2518,7 @@
           <a:p>
             <a:fld id="{9E2B9D65-9CB5-44CB-B647-17247A1ADF60}" type="datetimeFigureOut">
               <a:rPr lang="es-ES" smtClean="0"/>
-              <a:t>02/10/2024</a:t>
+              <a:t>08/09/2025</a:t>
             </a:fld>
             <a:endParaRPr lang="es-ES"/>
           </a:p>
@@ -2729,7 +2729,7 @@
           <a:p>
             <a:fld id="{9E2B9D65-9CB5-44CB-B647-17247A1ADF60}" type="datetimeFigureOut">
               <a:rPr lang="es-ES" smtClean="0"/>
-              <a:t>02/10/2024</a:t>
+              <a:t>08/09/2025</a:t>
             </a:fld>
             <a:endParaRPr lang="es-ES"/>
           </a:p>
@@ -4568,7 +4568,7 @@
                   <a:srgbClr val="FF0000"/>
                 </a:solidFill>
               </a:rPr>
-              <a:t>infer2020</a:t>
+              <a:t>infer2025</a:t>
             </a:r>
           </a:p>
         </p:txBody>
@@ -4630,7 +4630,7 @@
                   <a:srgbClr val="FF0000"/>
                 </a:solidFill>
               </a:rPr>
-              <a:t>password: infer2020</a:t>
+              <a:t>password: infer2025</a:t>
             </a:r>
           </a:p>
           <a:p>

</xml_diff>